<commit_message>
Chnages related to JS stuff
</commit_message>
<xml_diff>
--- a/PPT/D3JS HM Session.pptx
+++ b/PPT/D3JS HM Session.pptx
@@ -120,7 +120,7 @@
   </p:defaultTextStyle>
   <p:extLst>
     <p:ext uri="{EFAFB233-063F-42B5-8137-9DF3F51BA10A}">
-      <p15:sldGuideLst xmlns:p15="http://schemas.microsoft.com/office/powerpoint/2012/main">
+      <p15:sldGuideLst xmlns:p15="http://schemas.microsoft.com/office/powerpoint/2012/main" xmlns="">
         <p15:guide id="1" orient="horz" pos="2160">
           <p15:clr>
             <a:srgbClr val="A4A3A4"/>
@@ -134,7 +134,7 @@
       </p15:sldGuideLst>
     </p:ext>
     <p:ext uri="{2D200454-40CA-4A62-9FC3-DE9A4176ACB9}">
-      <p15:notesGuideLst xmlns:p15="http://schemas.microsoft.com/office/powerpoint/2012/main"/>
+      <p15:notesGuideLst xmlns:p15="http://schemas.microsoft.com/office/powerpoint/2012/main" xmlns=""/>
     </p:ext>
   </p:extLst>
 </p:presentation>
@@ -223,7 +223,7 @@
             <a:fld id="{F5CD968F-4B63-4AA9-A3CA-6AE4B1BF9AC9}" type="datetimeFigureOut">
               <a:rPr lang="en-US" smtClean="0"/>
               <a:pPr/>
-              <a:t>19-Oct-16</a:t>
+              <a:t>20-Oct-16</a:t>
             </a:fld>
             <a:endParaRPr lang="en-US"/>
           </a:p>
@@ -299,7 +299,7 @@
     </p:spTree>
     <p:extLst>
       <p:ext uri="{BB962C8B-B14F-4D97-AF65-F5344CB8AC3E}">
-        <p14:creationId xmlns:p14="http://schemas.microsoft.com/office/powerpoint/2010/main" val="139470452"/>
+        <p14:creationId xmlns:p14="http://schemas.microsoft.com/office/powerpoint/2010/main" xmlns="" val="139470452"/>
       </p:ext>
     </p:extLst>
   </p:cSld>
@@ -390,7 +390,7 @@
             <a:fld id="{72B56606-A9E2-4ADA-A650-A7B973193666}" type="datetimeFigureOut">
               <a:rPr lang="en-IN" smtClean="0"/>
               <a:pPr/>
-              <a:t>19-10-2016</a:t>
+              <a:t>20-10-2016</a:t>
             </a:fld>
             <a:endParaRPr lang="en-IN" dirty="0"/>
           </a:p>
@@ -559,7 +559,7 @@
     </p:spTree>
     <p:extLst>
       <p:ext uri="{BB962C8B-B14F-4D97-AF65-F5344CB8AC3E}">
-        <p14:creationId xmlns:p14="http://schemas.microsoft.com/office/powerpoint/2010/main" val="2187857066"/>
+        <p14:creationId xmlns:p14="http://schemas.microsoft.com/office/powerpoint/2010/main" xmlns="" val="2187857066"/>
       </p:ext>
     </p:extLst>
   </p:cSld>
@@ -750,7 +750,7 @@
     </p:spTree>
     <p:extLst>
       <p:ext uri="{BB962C8B-B14F-4D97-AF65-F5344CB8AC3E}">
-        <p14:creationId xmlns:p14="http://schemas.microsoft.com/office/powerpoint/2010/main" val="2889013532"/>
+        <p14:creationId xmlns:p14="http://schemas.microsoft.com/office/powerpoint/2010/main" xmlns="" val="2889013532"/>
       </p:ext>
     </p:extLst>
   </p:cSld>
@@ -851,7 +851,7 @@
     </p:spTree>
     <p:extLst>
       <p:ext uri="{BB962C8B-B14F-4D97-AF65-F5344CB8AC3E}">
-        <p14:creationId xmlns:p14="http://schemas.microsoft.com/office/powerpoint/2010/main" val="4258505874"/>
+        <p14:creationId xmlns:p14="http://schemas.microsoft.com/office/powerpoint/2010/main" xmlns="" val="4258505874"/>
       </p:ext>
     </p:extLst>
   </p:cSld>
@@ -952,7 +952,7 @@
     </p:spTree>
     <p:extLst>
       <p:ext uri="{BB962C8B-B14F-4D97-AF65-F5344CB8AC3E}">
-        <p14:creationId xmlns:p14="http://schemas.microsoft.com/office/powerpoint/2010/main" val="469995157"/>
+        <p14:creationId xmlns:p14="http://schemas.microsoft.com/office/powerpoint/2010/main" xmlns="" val="469995157"/>
       </p:ext>
     </p:extLst>
   </p:cSld>
@@ -1003,6 +1003,88 @@
         </p:nvSpPr>
         <p:spPr/>
         <p:txBody>
+          <a:bodyPr>
+            <a:normAutofit/>
+          </a:bodyPr>
+          <a:lstStyle/>
+          <a:p>
+            <a:endParaRPr lang="en-US" dirty="0"/>
+          </a:p>
+        </p:txBody>
+      </p:sp>
+      <p:sp>
+        <p:nvSpPr>
+          <p:cNvPr id="4" name="Slide Number Placeholder 3"/>
+          <p:cNvSpPr>
+            <a:spLocks noGrp="1"/>
+          </p:cNvSpPr>
+          <p:nvPr>
+            <p:ph type="sldNum" sz="quarter" idx="10"/>
+          </p:nvPr>
+        </p:nvSpPr>
+        <p:spPr/>
+        <p:txBody>
+          <a:bodyPr/>
+          <a:lstStyle/>
+          <a:p>
+            <a:fld id="{F579EF47-DE85-4BEA-9B49-71FE41CD9B4C}" type="slidenum">
+              <a:rPr lang="en-US" smtClean="0"/>
+              <a:pPr/>
+              <a:t>5</a:t>
+            </a:fld>
+            <a:endParaRPr lang="en-US"/>
+          </a:p>
+        </p:txBody>
+      </p:sp>
+    </p:spTree>
+  </p:cSld>
+  <p:clrMapOvr>
+    <a:masterClrMapping/>
+  </p:clrMapOvr>
+</p:notes>
+</file>
+
+<file path=ppt/notesSlides/notesSlide5.xml><?xml version="1.0" encoding="utf-8"?>
+<p:notes xmlns:a="http://schemas.openxmlformats.org/drawingml/2006/main" xmlns:r="http://schemas.openxmlformats.org/officeDocument/2006/relationships" xmlns:p="http://schemas.openxmlformats.org/presentationml/2006/main">
+  <p:cSld>
+    <p:spTree>
+      <p:nvGrpSpPr>
+        <p:cNvPr id="1" name=""/>
+        <p:cNvGrpSpPr/>
+        <p:nvPr/>
+      </p:nvGrpSpPr>
+      <p:grpSpPr>
+        <a:xfrm>
+          <a:off x="0" y="0"/>
+          <a:ext cx="0" cy="0"/>
+          <a:chOff x="0" y="0"/>
+          <a:chExt cx="0" cy="0"/>
+        </a:xfrm>
+      </p:grpSpPr>
+      <p:sp>
+        <p:nvSpPr>
+          <p:cNvPr id="2" name="Slide Image Placeholder 1"/>
+          <p:cNvSpPr>
+            <a:spLocks noGrp="1" noRot="1" noChangeAspect="1"/>
+          </p:cNvSpPr>
+          <p:nvPr>
+            <p:ph type="sldImg"/>
+          </p:nvPr>
+        </p:nvSpPr>
+        <p:spPr/>
+      </p:sp>
+      <p:sp>
+        <p:nvSpPr>
+          <p:cNvPr id="3" name="Notes Placeholder 2"/>
+          <p:cNvSpPr>
+            <a:spLocks noGrp="1"/>
+          </p:cNvSpPr>
+          <p:nvPr>
+            <p:ph type="body" idx="1"/>
+          </p:nvPr>
+        </p:nvSpPr>
+        <p:spPr/>
+        <p:txBody>
           <a:bodyPr/>
           <a:lstStyle/>
           <a:p>
@@ -1037,7 +1119,7 @@
     </p:spTree>
     <p:extLst>
       <p:ext uri="{BB962C8B-B14F-4D97-AF65-F5344CB8AC3E}">
-        <p14:creationId xmlns:p14="http://schemas.microsoft.com/office/powerpoint/2010/main" val="3132650928"/>
+        <p14:creationId xmlns:p14="http://schemas.microsoft.com/office/powerpoint/2010/main" xmlns="" val="3132650928"/>
       </p:ext>
     </p:extLst>
   </p:cSld>
@@ -1254,7 +1336,7 @@
     </p:spTree>
     <p:extLst>
       <p:ext uri="{BB962C8B-B14F-4D97-AF65-F5344CB8AC3E}">
-        <p14:creationId xmlns:p14="http://schemas.microsoft.com/office/powerpoint/2010/main" val="2692759447"/>
+        <p14:creationId xmlns:p14="http://schemas.microsoft.com/office/powerpoint/2010/main" xmlns="" val="2692759447"/>
       </p:ext>
     </p:extLst>
   </p:cSld>
@@ -1374,7 +1456,7 @@
     </p:spTree>
     <p:extLst>
       <p:ext uri="{BB962C8B-B14F-4D97-AF65-F5344CB8AC3E}">
-        <p14:creationId xmlns:p14="http://schemas.microsoft.com/office/powerpoint/2010/main" val="1074081834"/>
+        <p14:creationId xmlns:p14="http://schemas.microsoft.com/office/powerpoint/2010/main" xmlns="" val="1074081834"/>
       </p:ext>
     </p:extLst>
   </p:cSld>
@@ -1499,7 +1581,7 @@
     </p:spTree>
     <p:extLst>
       <p:ext uri="{BB962C8B-B14F-4D97-AF65-F5344CB8AC3E}">
-        <p14:creationId xmlns:p14="http://schemas.microsoft.com/office/powerpoint/2010/main" val="4143215043"/>
+        <p14:creationId xmlns:p14="http://schemas.microsoft.com/office/powerpoint/2010/main" xmlns="" val="4143215043"/>
       </p:ext>
     </p:extLst>
   </p:cSld>
@@ -1785,7 +1867,7 @@
     </p:spTree>
     <p:extLst>
       <p:ext uri="{BB962C8B-B14F-4D97-AF65-F5344CB8AC3E}">
-        <p14:creationId xmlns:p14="http://schemas.microsoft.com/office/powerpoint/2010/main" val="3071712877"/>
+        <p14:creationId xmlns:p14="http://schemas.microsoft.com/office/powerpoint/2010/main" xmlns="" val="3071712877"/>
       </p:ext>
     </p:extLst>
   </p:cSld>
@@ -1903,7 +1985,7 @@
     </p:spTree>
     <p:extLst>
       <p:ext uri="{BB962C8B-B14F-4D97-AF65-F5344CB8AC3E}">
-        <p14:creationId xmlns:p14="http://schemas.microsoft.com/office/powerpoint/2010/main" val="338042452"/>
+        <p14:creationId xmlns:p14="http://schemas.microsoft.com/office/powerpoint/2010/main" xmlns="" val="338042452"/>
       </p:ext>
     </p:extLst>
   </p:cSld>
@@ -1976,7 +2058,7 @@
     </p:spTree>
     <p:extLst>
       <p:ext uri="{BB962C8B-B14F-4D97-AF65-F5344CB8AC3E}">
-        <p14:creationId xmlns:p14="http://schemas.microsoft.com/office/powerpoint/2010/main" val="2378999301"/>
+        <p14:creationId xmlns:p14="http://schemas.microsoft.com/office/powerpoint/2010/main" xmlns="" val="2378999301"/>
       </p:ext>
     </p:extLst>
   </p:cSld>
@@ -2092,7 +2174,7 @@
                 </a:solidFill>
               </a:rPr>
               <a:pPr/>
-              <a:t>19-Oct-16</a:t>
+              <a:t>20-Oct-16</a:t>
             </a:fld>
             <a:endParaRPr lang="en-US" dirty="0">
               <a:solidFill>
@@ -2136,7 +2218,7 @@
     </p:spTree>
     <p:extLst>
       <p:ext uri="{BB962C8B-B14F-4D97-AF65-F5344CB8AC3E}">
-        <p14:creationId xmlns:p14="http://schemas.microsoft.com/office/powerpoint/2010/main" val="2720994796"/>
+        <p14:creationId xmlns:p14="http://schemas.microsoft.com/office/powerpoint/2010/main" xmlns="" val="2720994796"/>
       </p:ext>
     </p:extLst>
   </p:cSld>
@@ -2203,7 +2285,7 @@
                 </a:solidFill>
               </a:rPr>
               <a:pPr/>
-              <a:t>19-Oct-16</a:t>
+              <a:t>20-Oct-16</a:t>
             </a:fld>
             <a:endParaRPr lang="en-US" dirty="0">
               <a:solidFill>
@@ -2247,7 +2329,7 @@
     </p:spTree>
     <p:extLst>
       <p:ext uri="{BB962C8B-B14F-4D97-AF65-F5344CB8AC3E}">
-        <p14:creationId xmlns:p14="http://schemas.microsoft.com/office/powerpoint/2010/main" val="3277123733"/>
+        <p14:creationId xmlns:p14="http://schemas.microsoft.com/office/powerpoint/2010/main" xmlns="" val="3277123733"/>
       </p:ext>
     </p:extLst>
   </p:cSld>
@@ -2404,7 +2486,7 @@
     </p:spTree>
     <p:extLst>
       <p:ext uri="{BB962C8B-B14F-4D97-AF65-F5344CB8AC3E}">
-        <p14:creationId xmlns:p14="http://schemas.microsoft.com/office/powerpoint/2010/main" val="1336541791"/>
+        <p14:creationId xmlns:p14="http://schemas.microsoft.com/office/powerpoint/2010/main" xmlns="" val="1336541791"/>
       </p:ext>
     </p:extLst>
   </p:cSld>
@@ -2606,7 +2688,7 @@
           <a:blip r:embed="rId2">
             <a:extLst>
               <a:ext uri="{28A0092B-C50C-407E-A947-70E740481C1C}">
-                <a14:useLocalDpi xmlns:a14="http://schemas.microsoft.com/office/drawing/2010/main" val="0"/>
+                <a14:useLocalDpi xmlns:a14="http://schemas.microsoft.com/office/drawing/2010/main" xmlns="" val="0"/>
               </a:ext>
             </a:extLst>
           </a:blip>
@@ -2630,14 +2712,14 @@
           <a:effectLst/>
           <a:extLst>
             <a:ext uri="{909E8E84-426E-40DD-AFC4-6F175D3DCCD1}">
-              <a14:hiddenFill xmlns:a14="http://schemas.microsoft.com/office/drawing/2010/main">
+              <a14:hiddenFill xmlns:a14="http://schemas.microsoft.com/office/drawing/2010/main" xmlns="">
                 <a:solidFill>
                   <a:schemeClr val="accent1"/>
                 </a:solidFill>
               </a14:hiddenFill>
             </a:ext>
             <a:ext uri="{91240B29-F687-4F45-9708-019B960494DF}">
-              <a14:hiddenLine xmlns:a14="http://schemas.microsoft.com/office/drawing/2010/main" w="9525">
+              <a14:hiddenLine xmlns:a14="http://schemas.microsoft.com/office/drawing/2010/main" xmlns="" w="9525">
                 <a:solidFill>
                   <a:schemeClr val="tx1"/>
                 </a:solidFill>
@@ -2647,7 +2729,7 @@
               </a14:hiddenLine>
             </a:ext>
             <a:ext uri="{AF507438-7753-43E0-B8FC-AC1667EBCBE1}">
-              <a14:hiddenEffects xmlns:a14="http://schemas.microsoft.com/office/drawing/2010/main">
+              <a14:hiddenEffects xmlns:a14="http://schemas.microsoft.com/office/drawing/2010/main" xmlns="">
                 <a:effectLst>
                   <a:outerShdw dist="35921" dir="2700000" algn="ctr" rotWithShape="0">
                     <a:schemeClr val="bg2"/>
@@ -2661,7 +2743,7 @@
     </p:spTree>
     <p:extLst>
       <p:ext uri="{BB962C8B-B14F-4D97-AF65-F5344CB8AC3E}">
-        <p14:creationId xmlns:p14="http://schemas.microsoft.com/office/powerpoint/2010/main" val="4231051333"/>
+        <p14:creationId xmlns:p14="http://schemas.microsoft.com/office/powerpoint/2010/main" xmlns="" val="4231051333"/>
       </p:ext>
     </p:extLst>
   </p:cSld>
@@ -2894,7 +2976,7 @@
     </p:spTree>
     <p:extLst>
       <p:ext uri="{BB962C8B-B14F-4D97-AF65-F5344CB8AC3E}">
-        <p14:creationId xmlns:p14="http://schemas.microsoft.com/office/powerpoint/2010/main" val="833409394"/>
+        <p14:creationId xmlns:p14="http://schemas.microsoft.com/office/powerpoint/2010/main" xmlns="" val="833409394"/>
       </p:ext>
     </p:extLst>
   </p:cSld>
@@ -3261,7 +3343,7 @@
     </p:spTree>
     <p:extLst>
       <p:ext uri="{BB962C8B-B14F-4D97-AF65-F5344CB8AC3E}">
-        <p14:creationId xmlns:p14="http://schemas.microsoft.com/office/powerpoint/2010/main" val="2439176889"/>
+        <p14:creationId xmlns:p14="http://schemas.microsoft.com/office/powerpoint/2010/main" xmlns="" val="2439176889"/>
       </p:ext>
     </p:extLst>
   </p:cSld>
@@ -3332,7 +3414,7 @@
     </p:spTree>
     <p:extLst>
       <p:ext uri="{BB962C8B-B14F-4D97-AF65-F5344CB8AC3E}">
-        <p14:creationId xmlns:p14="http://schemas.microsoft.com/office/powerpoint/2010/main" val="3588038628"/>
+        <p14:creationId xmlns:p14="http://schemas.microsoft.com/office/powerpoint/2010/main" xmlns="" val="3588038628"/>
       </p:ext>
     </p:extLst>
   </p:cSld>
@@ -3372,7 +3454,7 @@
     </p:spTree>
     <p:extLst>
       <p:ext uri="{BB962C8B-B14F-4D97-AF65-F5344CB8AC3E}">
-        <p14:creationId xmlns:p14="http://schemas.microsoft.com/office/powerpoint/2010/main" val="3525834657"/>
+        <p14:creationId xmlns:p14="http://schemas.microsoft.com/office/powerpoint/2010/main" xmlns="" val="3525834657"/>
       </p:ext>
     </p:extLst>
   </p:cSld>
@@ -3594,7 +3676,7 @@
     </p:spTree>
     <p:extLst>
       <p:ext uri="{BB962C8B-B14F-4D97-AF65-F5344CB8AC3E}">
-        <p14:creationId xmlns:p14="http://schemas.microsoft.com/office/powerpoint/2010/main" val="3103102179"/>
+        <p14:creationId xmlns:p14="http://schemas.microsoft.com/office/powerpoint/2010/main" xmlns="" val="3103102179"/>
       </p:ext>
     </p:extLst>
   </p:cSld>
@@ -3796,7 +3878,7 @@
     </p:spTree>
     <p:extLst>
       <p:ext uri="{BB962C8B-B14F-4D97-AF65-F5344CB8AC3E}">
-        <p14:creationId xmlns:p14="http://schemas.microsoft.com/office/powerpoint/2010/main" val="1175446221"/>
+        <p14:creationId xmlns:p14="http://schemas.microsoft.com/office/powerpoint/2010/main" xmlns="" val="1175446221"/>
       </p:ext>
     </p:extLst>
   </p:cSld>
@@ -4027,7 +4109,7 @@
           <a:blip r:embed="rId19">
             <a:extLst>
               <a:ext uri="{28A0092B-C50C-407E-A947-70E740481C1C}">
-                <a14:useLocalDpi xmlns:a14="http://schemas.microsoft.com/office/drawing/2010/main" val="0"/>
+                <a14:useLocalDpi xmlns:a14="http://schemas.microsoft.com/office/drawing/2010/main" xmlns="" val="0"/>
               </a:ext>
             </a:extLst>
           </a:blip>
@@ -4049,14 +4131,14 @@
           <a:effectLst/>
           <a:extLst>
             <a:ext uri="{909E8E84-426E-40DD-AFC4-6F175D3DCCD1}">
-              <a14:hiddenFill xmlns:a14="http://schemas.microsoft.com/office/drawing/2010/main">
+              <a14:hiddenFill xmlns:a14="http://schemas.microsoft.com/office/drawing/2010/main" xmlns="">
                 <a:solidFill>
                   <a:schemeClr val="accent1"/>
                 </a:solidFill>
               </a14:hiddenFill>
             </a:ext>
             <a:ext uri="{91240B29-F687-4F45-9708-019B960494DF}">
-              <a14:hiddenLine xmlns:a14="http://schemas.microsoft.com/office/drawing/2010/main" w="9525">
+              <a14:hiddenLine xmlns:a14="http://schemas.microsoft.com/office/drawing/2010/main" xmlns="" w="9525">
                 <a:solidFill>
                   <a:schemeClr val="tx1"/>
                 </a:solidFill>
@@ -4066,7 +4148,7 @@
               </a14:hiddenLine>
             </a:ext>
             <a:ext uri="{AF507438-7753-43E0-B8FC-AC1667EBCBE1}">
-              <a14:hiddenEffects xmlns:a14="http://schemas.microsoft.com/office/drawing/2010/main">
+              <a14:hiddenEffects xmlns:a14="http://schemas.microsoft.com/office/drawing/2010/main" xmlns="">
                 <a:effectLst>
                   <a:outerShdw dist="35921" dir="2700000" algn="ctr" rotWithShape="0">
                     <a:schemeClr val="bg2"/>
@@ -4122,7 +4204,7 @@
     </p:spTree>
     <p:extLst>
       <p:ext uri="{BB962C8B-B14F-4D97-AF65-F5344CB8AC3E}">
-        <p14:creationId xmlns:p14="http://schemas.microsoft.com/office/powerpoint/2010/main" val="2633422448"/>
+        <p14:creationId xmlns:p14="http://schemas.microsoft.com/office/powerpoint/2010/main" xmlns="" val="2633422448"/>
       </p:ext>
     </p:extLst>
   </p:cSld>
@@ -4563,7 +4645,7 @@
     </p:spTree>
     <p:extLst>
       <p:ext uri="{BB962C8B-B14F-4D97-AF65-F5344CB8AC3E}">
-        <p14:creationId xmlns:p14="http://schemas.microsoft.com/office/powerpoint/2010/main" val="1443008720"/>
+        <p14:creationId xmlns:p14="http://schemas.microsoft.com/office/powerpoint/2010/main" xmlns="" val="1443008720"/>
       </p:ext>
     </p:extLst>
   </p:cSld>
@@ -4696,20 +4778,15 @@
           <a:p>
             <a:r>
               <a:rPr lang="en-US" sz="3700" dirty="0" smtClean="0"/>
-              <a:t>Learning curve and Resources </a:t>
-            </a:r>
-            <a:r>
-              <a:rPr lang="en-US" sz="3700" dirty="0" smtClean="0"/>
-              <a:t>availability</a:t>
-            </a:r>
-            <a:endParaRPr lang="en-US" sz="3700" dirty="0" smtClean="0"/>
+              <a:t>Learning curve and Resources availability</a:t>
+            </a:r>
           </a:p>
         </p:txBody>
       </p:sp>
     </p:spTree>
     <p:extLst>
       <p:ext uri="{BB962C8B-B14F-4D97-AF65-F5344CB8AC3E}">
-        <p14:creationId xmlns:p14="http://schemas.microsoft.com/office/powerpoint/2010/main" val="445028119"/>
+        <p14:creationId xmlns:p14="http://schemas.microsoft.com/office/powerpoint/2010/main" xmlns="" val="445028119"/>
       </p:ext>
     </p:extLst>
   </p:cSld>
@@ -4888,7 +4965,7 @@
     </p:spTree>
     <p:extLst>
       <p:ext uri="{BB962C8B-B14F-4D97-AF65-F5344CB8AC3E}">
-        <p14:creationId xmlns:p14="http://schemas.microsoft.com/office/powerpoint/2010/main" val="3753045211"/>
+        <p14:creationId xmlns:p14="http://schemas.microsoft.com/office/powerpoint/2010/main" xmlns="" val="3753045211"/>
       </p:ext>
     </p:extLst>
   </p:cSld>
@@ -4981,7 +5058,7 @@
     </p:spTree>
     <p:extLst>
       <p:ext uri="{BB962C8B-B14F-4D97-AF65-F5344CB8AC3E}">
-        <p14:creationId xmlns:p14="http://schemas.microsoft.com/office/powerpoint/2010/main" val="412434483"/>
+        <p14:creationId xmlns:p14="http://schemas.microsoft.com/office/powerpoint/2010/main" xmlns="" val="412434483"/>
       </p:ext>
     </p:extLst>
   </p:cSld>
@@ -5125,7 +5202,7 @@
                   <a:srgbClr val="00B050"/>
                 </a:solidFill>
               </a:rPr>
-              <a:t> Carousel, Popover, </a:t>
+              <a:t> Carousel, </a:t>
             </a:r>
             <a:r>
               <a:rPr lang="en-US" sz="4000" dirty="0" smtClean="0">
@@ -5133,7 +5210,7 @@
                   <a:srgbClr val="00B050"/>
                 </a:solidFill>
               </a:rPr>
-              <a:t>Scrollspy</a:t>
+              <a:t>Popover</a:t>
             </a:r>
           </a:p>
           <a:p>
@@ -5179,7 +5256,7 @@
     </p:spTree>
     <p:extLst>
       <p:ext uri="{BB962C8B-B14F-4D97-AF65-F5344CB8AC3E}">
-        <p14:creationId xmlns:p14="http://schemas.microsoft.com/office/powerpoint/2010/main" val="269019086"/>
+        <p14:creationId xmlns:p14="http://schemas.microsoft.com/office/powerpoint/2010/main" xmlns="" val="269019086"/>
       </p:ext>
     </p:extLst>
   </p:cSld>
@@ -5950,7 +6027,7 @@
     </p:spTree>
     <p:extLst>
       <p:ext uri="{BB962C8B-B14F-4D97-AF65-F5344CB8AC3E}">
-        <p14:creationId xmlns:p14="http://schemas.microsoft.com/office/powerpoint/2010/main" val="1680884351"/>
+        <p14:creationId xmlns:p14="http://schemas.microsoft.com/office/powerpoint/2010/main" xmlns="" val="1680884351"/>
       </p:ext>
     </p:extLst>
   </p:cSld>
@@ -6221,18 +6298,12 @@
               <a:rPr lang="en-US" sz="2500" dirty="0" smtClean="0"/>
               <a:t>.</a:t>
             </a:r>
-            <a:endParaRPr lang="en-US" sz="2500" dirty="0" smtClean="0"/>
           </a:p>
           <a:p>
             <a:r>
               <a:rPr lang="en-US" sz="2500" dirty="0" smtClean="0"/>
-              <a:t>Step 3 : Go for some </a:t>
-            </a:r>
-            <a:r>
-              <a:rPr lang="en-US" sz="2500" dirty="0" smtClean="0"/>
-              <a:t>samples.</a:t>
-            </a:r>
-            <a:endParaRPr lang="en-US" sz="2500" dirty="0" smtClean="0"/>
+              <a:t>Step 3 : Go for some samples.</a:t>
+            </a:r>
           </a:p>
           <a:p>
             <a:r>
@@ -6285,7 +6356,7 @@
     </p:spTree>
     <p:extLst>
       <p:ext uri="{BB962C8B-B14F-4D97-AF65-F5344CB8AC3E}">
-        <p14:creationId xmlns:p14="http://schemas.microsoft.com/office/powerpoint/2010/main" val="1419989926"/>
+        <p14:creationId xmlns:p14="http://schemas.microsoft.com/office/powerpoint/2010/main" xmlns="" val="1419989926"/>
       </p:ext>
     </p:extLst>
   </p:cSld>
@@ -6355,7 +6426,7 @@
           <a:blip r:embed="rId2">
             <a:extLst>
               <a:ext uri="{28A0092B-C50C-407E-A947-70E740481C1C}">
-                <a14:useLocalDpi xmlns:a14="http://schemas.microsoft.com/office/drawing/2010/main" val="0"/>
+                <a14:useLocalDpi xmlns:a14="http://schemas.microsoft.com/office/drawing/2010/main" xmlns="" val="0"/>
               </a:ext>
             </a:extLst>
           </a:blip>
@@ -6375,7 +6446,7 @@
           <a:noFill/>
           <a:extLst>
             <a:ext uri="{909E8E84-426E-40DD-AFC4-6F175D3DCCD1}">
-              <a14:hiddenFill xmlns:a14="http://schemas.microsoft.com/office/drawing/2010/main">
+              <a14:hiddenFill xmlns:a14="http://schemas.microsoft.com/office/drawing/2010/main" xmlns="">
                 <a:solidFill>
                   <a:srgbClr val="FFFFFF"/>
                 </a:solidFill>
@@ -6387,7 +6458,7 @@
     </p:spTree>
     <p:extLst>
       <p:ext uri="{BB962C8B-B14F-4D97-AF65-F5344CB8AC3E}">
-        <p14:creationId xmlns:p14="http://schemas.microsoft.com/office/powerpoint/2010/main" val="3759781854"/>
+        <p14:creationId xmlns:p14="http://schemas.microsoft.com/office/powerpoint/2010/main" xmlns="" val="3759781854"/>
       </p:ext>
     </p:extLst>
   </p:cSld>
@@ -7246,7 +7317,7 @@
   <a:extraClrSchemeLst/>
   <a:extLst>
     <a:ext uri="{05A4C25C-085E-4340-85A3-A5531E510DB2}">
-      <thm15:themeFamily xmlns:thm15="http://schemas.microsoft.com/office/thememl/2012/main" name="Office Theme" id="{62F939B6-93AF-4DB8-9C6B-D6C7DFDC589F}" vid="{4A3C46E8-61CC-4603-A589-7422A47A8E4A}"/>
+      <thm15:themeFamily xmlns:thm15="http://schemas.microsoft.com/office/thememl/2012/main" xmlns="" name="Office Theme" id="{62F939B6-93AF-4DB8-9C6B-D6C7DFDC589F}" vid="{4A3C46E8-61CC-4603-A589-7422A47A8E4A}"/>
     </a:ext>
   </a:extLst>
 </a:theme>

</xml_diff>

<commit_message>
Changes related to Grid System
</commit_message>
<xml_diff>
--- a/PPT/D3JS HM Session.pptx
+++ b/PPT/D3JS HM Session.pptx
@@ -120,7 +120,7 @@
   </p:defaultTextStyle>
   <p:extLst>
     <p:ext uri="{EFAFB233-063F-42B5-8137-9DF3F51BA10A}">
-      <p15:sldGuideLst xmlns:p15="http://schemas.microsoft.com/office/powerpoint/2012/main" xmlns="">
+      <p15:sldGuideLst xmlns:p15="http://schemas.microsoft.com/office/powerpoint/2012/main">
         <p15:guide id="1" orient="horz" pos="2160">
           <p15:clr>
             <a:srgbClr val="A4A3A4"/>
@@ -134,7 +134,7 @@
       </p15:sldGuideLst>
     </p:ext>
     <p:ext uri="{2D200454-40CA-4A62-9FC3-DE9A4176ACB9}">
-      <p15:notesGuideLst xmlns:p15="http://schemas.microsoft.com/office/powerpoint/2012/main" xmlns=""/>
+      <p15:notesGuideLst xmlns:p15="http://schemas.microsoft.com/office/powerpoint/2012/main"/>
     </p:ext>
   </p:extLst>
 </p:presentation>
@@ -299,7 +299,7 @@
     </p:spTree>
     <p:extLst>
       <p:ext uri="{BB962C8B-B14F-4D97-AF65-F5344CB8AC3E}">
-        <p14:creationId xmlns:p14="http://schemas.microsoft.com/office/powerpoint/2010/main" xmlns="" val="139470452"/>
+        <p14:creationId xmlns:p14="http://schemas.microsoft.com/office/powerpoint/2010/main" val="139470452"/>
       </p:ext>
     </p:extLst>
   </p:cSld>
@@ -559,7 +559,7 @@
     </p:spTree>
     <p:extLst>
       <p:ext uri="{BB962C8B-B14F-4D97-AF65-F5344CB8AC3E}">
-        <p14:creationId xmlns:p14="http://schemas.microsoft.com/office/powerpoint/2010/main" xmlns="" val="2187857066"/>
+        <p14:creationId xmlns:p14="http://schemas.microsoft.com/office/powerpoint/2010/main" val="2187857066"/>
       </p:ext>
     </p:extLst>
   </p:cSld>
@@ -750,7 +750,7 @@
     </p:spTree>
     <p:extLst>
       <p:ext uri="{BB962C8B-B14F-4D97-AF65-F5344CB8AC3E}">
-        <p14:creationId xmlns:p14="http://schemas.microsoft.com/office/powerpoint/2010/main" xmlns="" val="2889013532"/>
+        <p14:creationId xmlns:p14="http://schemas.microsoft.com/office/powerpoint/2010/main" val="2889013532"/>
       </p:ext>
     </p:extLst>
   </p:cSld>
@@ -851,7 +851,7 @@
     </p:spTree>
     <p:extLst>
       <p:ext uri="{BB962C8B-B14F-4D97-AF65-F5344CB8AC3E}">
-        <p14:creationId xmlns:p14="http://schemas.microsoft.com/office/powerpoint/2010/main" xmlns="" val="4258505874"/>
+        <p14:creationId xmlns:p14="http://schemas.microsoft.com/office/powerpoint/2010/main" val="4258505874"/>
       </p:ext>
     </p:extLst>
   </p:cSld>
@@ -952,7 +952,7 @@
     </p:spTree>
     <p:extLst>
       <p:ext uri="{BB962C8B-B14F-4D97-AF65-F5344CB8AC3E}">
-        <p14:creationId xmlns:p14="http://schemas.microsoft.com/office/powerpoint/2010/main" xmlns="" val="469995157"/>
+        <p14:creationId xmlns:p14="http://schemas.microsoft.com/office/powerpoint/2010/main" val="469995157"/>
       </p:ext>
     </p:extLst>
   </p:cSld>
@@ -1037,6 +1037,11 @@
         </p:txBody>
       </p:sp>
     </p:spTree>
+    <p:extLst>
+      <p:ext uri="{BB962C8B-B14F-4D97-AF65-F5344CB8AC3E}">
+        <p14:creationId xmlns:p14="http://schemas.microsoft.com/office/powerpoint/2010/main" val="2938396876"/>
+      </p:ext>
+    </p:extLst>
   </p:cSld>
   <p:clrMapOvr>
     <a:masterClrMapping/>
@@ -1119,7 +1124,7 @@
     </p:spTree>
     <p:extLst>
       <p:ext uri="{BB962C8B-B14F-4D97-AF65-F5344CB8AC3E}">
-        <p14:creationId xmlns:p14="http://schemas.microsoft.com/office/powerpoint/2010/main" xmlns="" val="3132650928"/>
+        <p14:creationId xmlns:p14="http://schemas.microsoft.com/office/powerpoint/2010/main" val="3132650928"/>
       </p:ext>
     </p:extLst>
   </p:cSld>
@@ -1336,7 +1341,7 @@
     </p:spTree>
     <p:extLst>
       <p:ext uri="{BB962C8B-B14F-4D97-AF65-F5344CB8AC3E}">
-        <p14:creationId xmlns:p14="http://schemas.microsoft.com/office/powerpoint/2010/main" xmlns="" val="2692759447"/>
+        <p14:creationId xmlns:p14="http://schemas.microsoft.com/office/powerpoint/2010/main" val="2692759447"/>
       </p:ext>
     </p:extLst>
   </p:cSld>
@@ -1456,7 +1461,7 @@
     </p:spTree>
     <p:extLst>
       <p:ext uri="{BB962C8B-B14F-4D97-AF65-F5344CB8AC3E}">
-        <p14:creationId xmlns:p14="http://schemas.microsoft.com/office/powerpoint/2010/main" xmlns="" val="1074081834"/>
+        <p14:creationId xmlns:p14="http://schemas.microsoft.com/office/powerpoint/2010/main" val="1074081834"/>
       </p:ext>
     </p:extLst>
   </p:cSld>
@@ -1581,7 +1586,7 @@
     </p:spTree>
     <p:extLst>
       <p:ext uri="{BB962C8B-B14F-4D97-AF65-F5344CB8AC3E}">
-        <p14:creationId xmlns:p14="http://schemas.microsoft.com/office/powerpoint/2010/main" xmlns="" val="4143215043"/>
+        <p14:creationId xmlns:p14="http://schemas.microsoft.com/office/powerpoint/2010/main" val="4143215043"/>
       </p:ext>
     </p:extLst>
   </p:cSld>
@@ -1867,7 +1872,7 @@
     </p:spTree>
     <p:extLst>
       <p:ext uri="{BB962C8B-B14F-4D97-AF65-F5344CB8AC3E}">
-        <p14:creationId xmlns:p14="http://schemas.microsoft.com/office/powerpoint/2010/main" xmlns="" val="3071712877"/>
+        <p14:creationId xmlns:p14="http://schemas.microsoft.com/office/powerpoint/2010/main" val="3071712877"/>
       </p:ext>
     </p:extLst>
   </p:cSld>
@@ -1985,7 +1990,7 @@
     </p:spTree>
     <p:extLst>
       <p:ext uri="{BB962C8B-B14F-4D97-AF65-F5344CB8AC3E}">
-        <p14:creationId xmlns:p14="http://schemas.microsoft.com/office/powerpoint/2010/main" xmlns="" val="338042452"/>
+        <p14:creationId xmlns:p14="http://schemas.microsoft.com/office/powerpoint/2010/main" val="338042452"/>
       </p:ext>
     </p:extLst>
   </p:cSld>
@@ -2058,7 +2063,7 @@
     </p:spTree>
     <p:extLst>
       <p:ext uri="{BB962C8B-B14F-4D97-AF65-F5344CB8AC3E}">
-        <p14:creationId xmlns:p14="http://schemas.microsoft.com/office/powerpoint/2010/main" xmlns="" val="2378999301"/>
+        <p14:creationId xmlns:p14="http://schemas.microsoft.com/office/powerpoint/2010/main" val="2378999301"/>
       </p:ext>
     </p:extLst>
   </p:cSld>
@@ -2218,7 +2223,7 @@
     </p:spTree>
     <p:extLst>
       <p:ext uri="{BB962C8B-B14F-4D97-AF65-F5344CB8AC3E}">
-        <p14:creationId xmlns:p14="http://schemas.microsoft.com/office/powerpoint/2010/main" xmlns="" val="2720994796"/>
+        <p14:creationId xmlns:p14="http://schemas.microsoft.com/office/powerpoint/2010/main" val="2720994796"/>
       </p:ext>
     </p:extLst>
   </p:cSld>
@@ -2329,7 +2334,7 @@
     </p:spTree>
     <p:extLst>
       <p:ext uri="{BB962C8B-B14F-4D97-AF65-F5344CB8AC3E}">
-        <p14:creationId xmlns:p14="http://schemas.microsoft.com/office/powerpoint/2010/main" xmlns="" val="3277123733"/>
+        <p14:creationId xmlns:p14="http://schemas.microsoft.com/office/powerpoint/2010/main" val="3277123733"/>
       </p:ext>
     </p:extLst>
   </p:cSld>
@@ -2486,7 +2491,7 @@
     </p:spTree>
     <p:extLst>
       <p:ext uri="{BB962C8B-B14F-4D97-AF65-F5344CB8AC3E}">
-        <p14:creationId xmlns:p14="http://schemas.microsoft.com/office/powerpoint/2010/main" xmlns="" val="1336541791"/>
+        <p14:creationId xmlns:p14="http://schemas.microsoft.com/office/powerpoint/2010/main" val="1336541791"/>
       </p:ext>
     </p:extLst>
   </p:cSld>
@@ -2688,7 +2693,7 @@
           <a:blip r:embed="rId2">
             <a:extLst>
               <a:ext uri="{28A0092B-C50C-407E-A947-70E740481C1C}">
-                <a14:useLocalDpi xmlns:a14="http://schemas.microsoft.com/office/drawing/2010/main" xmlns="" val="0"/>
+                <a14:useLocalDpi xmlns:a14="http://schemas.microsoft.com/office/drawing/2010/main" val="0"/>
               </a:ext>
             </a:extLst>
           </a:blip>
@@ -2712,14 +2717,14 @@
           <a:effectLst/>
           <a:extLst>
             <a:ext uri="{909E8E84-426E-40DD-AFC4-6F175D3DCCD1}">
-              <a14:hiddenFill xmlns:a14="http://schemas.microsoft.com/office/drawing/2010/main" xmlns="">
+              <a14:hiddenFill xmlns:a14="http://schemas.microsoft.com/office/drawing/2010/main">
                 <a:solidFill>
                   <a:schemeClr val="accent1"/>
                 </a:solidFill>
               </a14:hiddenFill>
             </a:ext>
             <a:ext uri="{91240B29-F687-4F45-9708-019B960494DF}">
-              <a14:hiddenLine xmlns:a14="http://schemas.microsoft.com/office/drawing/2010/main" xmlns="" w="9525">
+              <a14:hiddenLine xmlns:a14="http://schemas.microsoft.com/office/drawing/2010/main" w="9525">
                 <a:solidFill>
                   <a:schemeClr val="tx1"/>
                 </a:solidFill>
@@ -2729,7 +2734,7 @@
               </a14:hiddenLine>
             </a:ext>
             <a:ext uri="{AF507438-7753-43E0-B8FC-AC1667EBCBE1}">
-              <a14:hiddenEffects xmlns:a14="http://schemas.microsoft.com/office/drawing/2010/main" xmlns="">
+              <a14:hiddenEffects xmlns:a14="http://schemas.microsoft.com/office/drawing/2010/main">
                 <a:effectLst>
                   <a:outerShdw dist="35921" dir="2700000" algn="ctr" rotWithShape="0">
                     <a:schemeClr val="bg2"/>
@@ -2743,7 +2748,7 @@
     </p:spTree>
     <p:extLst>
       <p:ext uri="{BB962C8B-B14F-4D97-AF65-F5344CB8AC3E}">
-        <p14:creationId xmlns:p14="http://schemas.microsoft.com/office/powerpoint/2010/main" xmlns="" val="4231051333"/>
+        <p14:creationId xmlns:p14="http://schemas.microsoft.com/office/powerpoint/2010/main" val="4231051333"/>
       </p:ext>
     </p:extLst>
   </p:cSld>
@@ -2976,7 +2981,7 @@
     </p:spTree>
     <p:extLst>
       <p:ext uri="{BB962C8B-B14F-4D97-AF65-F5344CB8AC3E}">
-        <p14:creationId xmlns:p14="http://schemas.microsoft.com/office/powerpoint/2010/main" xmlns="" val="833409394"/>
+        <p14:creationId xmlns:p14="http://schemas.microsoft.com/office/powerpoint/2010/main" val="833409394"/>
       </p:ext>
     </p:extLst>
   </p:cSld>
@@ -3343,7 +3348,7 @@
     </p:spTree>
     <p:extLst>
       <p:ext uri="{BB962C8B-B14F-4D97-AF65-F5344CB8AC3E}">
-        <p14:creationId xmlns:p14="http://schemas.microsoft.com/office/powerpoint/2010/main" xmlns="" val="2439176889"/>
+        <p14:creationId xmlns:p14="http://schemas.microsoft.com/office/powerpoint/2010/main" val="2439176889"/>
       </p:ext>
     </p:extLst>
   </p:cSld>
@@ -3414,7 +3419,7 @@
     </p:spTree>
     <p:extLst>
       <p:ext uri="{BB962C8B-B14F-4D97-AF65-F5344CB8AC3E}">
-        <p14:creationId xmlns:p14="http://schemas.microsoft.com/office/powerpoint/2010/main" xmlns="" val="3588038628"/>
+        <p14:creationId xmlns:p14="http://schemas.microsoft.com/office/powerpoint/2010/main" val="3588038628"/>
       </p:ext>
     </p:extLst>
   </p:cSld>
@@ -3454,7 +3459,7 @@
     </p:spTree>
     <p:extLst>
       <p:ext uri="{BB962C8B-B14F-4D97-AF65-F5344CB8AC3E}">
-        <p14:creationId xmlns:p14="http://schemas.microsoft.com/office/powerpoint/2010/main" xmlns="" val="3525834657"/>
+        <p14:creationId xmlns:p14="http://schemas.microsoft.com/office/powerpoint/2010/main" val="3525834657"/>
       </p:ext>
     </p:extLst>
   </p:cSld>
@@ -3676,7 +3681,7 @@
     </p:spTree>
     <p:extLst>
       <p:ext uri="{BB962C8B-B14F-4D97-AF65-F5344CB8AC3E}">
-        <p14:creationId xmlns:p14="http://schemas.microsoft.com/office/powerpoint/2010/main" xmlns="" val="3103102179"/>
+        <p14:creationId xmlns:p14="http://schemas.microsoft.com/office/powerpoint/2010/main" val="3103102179"/>
       </p:ext>
     </p:extLst>
   </p:cSld>
@@ -3878,7 +3883,7 @@
     </p:spTree>
     <p:extLst>
       <p:ext uri="{BB962C8B-B14F-4D97-AF65-F5344CB8AC3E}">
-        <p14:creationId xmlns:p14="http://schemas.microsoft.com/office/powerpoint/2010/main" xmlns="" val="1175446221"/>
+        <p14:creationId xmlns:p14="http://schemas.microsoft.com/office/powerpoint/2010/main" val="1175446221"/>
       </p:ext>
     </p:extLst>
   </p:cSld>
@@ -4109,7 +4114,7 @@
           <a:blip r:embed="rId19">
             <a:extLst>
               <a:ext uri="{28A0092B-C50C-407E-A947-70E740481C1C}">
-                <a14:useLocalDpi xmlns:a14="http://schemas.microsoft.com/office/drawing/2010/main" xmlns="" val="0"/>
+                <a14:useLocalDpi xmlns:a14="http://schemas.microsoft.com/office/drawing/2010/main" val="0"/>
               </a:ext>
             </a:extLst>
           </a:blip>
@@ -4131,14 +4136,14 @@
           <a:effectLst/>
           <a:extLst>
             <a:ext uri="{909E8E84-426E-40DD-AFC4-6F175D3DCCD1}">
-              <a14:hiddenFill xmlns:a14="http://schemas.microsoft.com/office/drawing/2010/main" xmlns="">
+              <a14:hiddenFill xmlns:a14="http://schemas.microsoft.com/office/drawing/2010/main">
                 <a:solidFill>
                   <a:schemeClr val="accent1"/>
                 </a:solidFill>
               </a14:hiddenFill>
             </a:ext>
             <a:ext uri="{91240B29-F687-4F45-9708-019B960494DF}">
-              <a14:hiddenLine xmlns:a14="http://schemas.microsoft.com/office/drawing/2010/main" xmlns="" w="9525">
+              <a14:hiddenLine xmlns:a14="http://schemas.microsoft.com/office/drawing/2010/main" w="9525">
                 <a:solidFill>
                   <a:schemeClr val="tx1"/>
                 </a:solidFill>
@@ -4148,7 +4153,7 @@
               </a14:hiddenLine>
             </a:ext>
             <a:ext uri="{AF507438-7753-43E0-B8FC-AC1667EBCBE1}">
-              <a14:hiddenEffects xmlns:a14="http://schemas.microsoft.com/office/drawing/2010/main" xmlns="">
+              <a14:hiddenEffects xmlns:a14="http://schemas.microsoft.com/office/drawing/2010/main">
                 <a:effectLst>
                   <a:outerShdw dist="35921" dir="2700000" algn="ctr" rotWithShape="0">
                     <a:schemeClr val="bg2"/>
@@ -4204,7 +4209,7 @@
     </p:spTree>
     <p:extLst>
       <p:ext uri="{BB962C8B-B14F-4D97-AF65-F5344CB8AC3E}">
-        <p14:creationId xmlns:p14="http://schemas.microsoft.com/office/powerpoint/2010/main" xmlns="" val="2633422448"/>
+        <p14:creationId xmlns:p14="http://schemas.microsoft.com/office/powerpoint/2010/main" val="2633422448"/>
       </p:ext>
     </p:extLst>
   </p:cSld>
@@ -4645,7 +4650,7 @@
     </p:spTree>
     <p:extLst>
       <p:ext uri="{BB962C8B-B14F-4D97-AF65-F5344CB8AC3E}">
-        <p14:creationId xmlns:p14="http://schemas.microsoft.com/office/powerpoint/2010/main" xmlns="" val="1443008720"/>
+        <p14:creationId xmlns:p14="http://schemas.microsoft.com/office/powerpoint/2010/main" val="1443008720"/>
       </p:ext>
     </p:extLst>
   </p:cSld>
@@ -4786,7 +4791,7 @@
     </p:spTree>
     <p:extLst>
       <p:ext uri="{BB962C8B-B14F-4D97-AF65-F5344CB8AC3E}">
-        <p14:creationId xmlns:p14="http://schemas.microsoft.com/office/powerpoint/2010/main" xmlns="" val="445028119"/>
+        <p14:creationId xmlns:p14="http://schemas.microsoft.com/office/powerpoint/2010/main" val="445028119"/>
       </p:ext>
     </p:extLst>
   </p:cSld>
@@ -4965,7 +4970,7 @@
     </p:spTree>
     <p:extLst>
       <p:ext uri="{BB962C8B-B14F-4D97-AF65-F5344CB8AC3E}">
-        <p14:creationId xmlns:p14="http://schemas.microsoft.com/office/powerpoint/2010/main" xmlns="" val="3753045211"/>
+        <p14:creationId xmlns:p14="http://schemas.microsoft.com/office/powerpoint/2010/main" val="3753045211"/>
       </p:ext>
     </p:extLst>
   </p:cSld>
@@ -5041,24 +5046,100 @@
             <p:ph idx="1"/>
           </p:nvPr>
         </p:nvSpPr>
-        <p:spPr/>
+        <p:spPr>
+          <a:xfrm>
+            <a:off x="1141412" y="1676400"/>
+            <a:ext cx="10360181" cy="4191000"/>
+          </a:xfrm>
+        </p:spPr>
         <p:txBody>
           <a:bodyPr>
             <a:noAutofit/>
           </a:bodyPr>
           <a:lstStyle/>
           <a:p>
+            <a:pPr>
+              <a:buFont typeface="Wingdings" panose="05000000000000000000" pitchFamily="2" charset="2"/>
+              <a:buChar char="ü"/>
+            </a:pPr>
+            <a:r>
+              <a:rPr lang="en-US" sz="5000" dirty="0" smtClean="0">
+                <a:solidFill>
+                  <a:srgbClr val="00B050"/>
+                </a:solidFill>
+              </a:rPr>
+              <a:t> Basic Grid System</a:t>
+            </a:r>
+          </a:p>
+          <a:p>
+            <a:pPr>
+              <a:buFont typeface="Wingdings" panose="05000000000000000000" pitchFamily="2" charset="2"/>
+              <a:buChar char="ü"/>
+            </a:pPr>
+            <a:r>
+              <a:rPr lang="en-US" sz="5000" dirty="0" smtClean="0">
+                <a:solidFill>
+                  <a:srgbClr val="00B050"/>
+                </a:solidFill>
+              </a:rPr>
+              <a:t> Grid Classes</a:t>
+            </a:r>
+            <a:endParaRPr lang="en-US" sz="5000" dirty="0">
+              <a:solidFill>
+                <a:srgbClr val="00B050"/>
+              </a:solidFill>
+            </a:endParaRPr>
+          </a:p>
+          <a:p>
+            <a:pPr>
+              <a:buFont typeface="Wingdings" panose="05000000000000000000" pitchFamily="2" charset="2"/>
+              <a:buChar char="ü"/>
+            </a:pPr>
+            <a:r>
+              <a:rPr lang="en-US" sz="5000" dirty="0">
+                <a:solidFill>
+                  <a:srgbClr val="00B050"/>
+                </a:solidFill>
+              </a:rPr>
+              <a:t> </a:t>
+            </a:r>
+            <a:r>
+              <a:rPr lang="en-US" sz="5000" dirty="0" smtClean="0">
+                <a:solidFill>
+                  <a:srgbClr val="00B050"/>
+                </a:solidFill>
+              </a:rPr>
+              <a:t>Examples</a:t>
+            </a:r>
+            <a:endParaRPr lang="en-US" sz="5000" dirty="0">
+              <a:solidFill>
+                <a:srgbClr val="00B050"/>
+              </a:solidFill>
+            </a:endParaRPr>
+          </a:p>
+          <a:p>
+            <a:pPr>
+              <a:buFont typeface="Wingdings" panose="05000000000000000000" pitchFamily="2" charset="2"/>
+              <a:buChar char="ü"/>
+            </a:pPr>
+            <a:endParaRPr lang="en-US" sz="5000" dirty="0">
+              <a:solidFill>
+                <a:srgbClr val="00B050"/>
+              </a:solidFill>
+            </a:endParaRPr>
+          </a:p>
+          <a:p>
             <a:pPr marL="0" indent="0">
               <a:buNone/>
             </a:pPr>
-            <a:endParaRPr lang="en-US" sz="2100" dirty="0"/>
+            <a:endParaRPr lang="en-US" sz="5000" dirty="0"/>
           </a:p>
         </p:txBody>
       </p:sp>
     </p:spTree>
     <p:extLst>
       <p:ext uri="{BB962C8B-B14F-4D97-AF65-F5344CB8AC3E}">
-        <p14:creationId xmlns:p14="http://schemas.microsoft.com/office/powerpoint/2010/main" xmlns="" val="412434483"/>
+        <p14:creationId xmlns:p14="http://schemas.microsoft.com/office/powerpoint/2010/main" val="412434483"/>
       </p:ext>
     </p:extLst>
   </p:cSld>
@@ -5256,7 +5337,7 @@
     </p:spTree>
     <p:extLst>
       <p:ext uri="{BB962C8B-B14F-4D97-AF65-F5344CB8AC3E}">
-        <p14:creationId xmlns:p14="http://schemas.microsoft.com/office/powerpoint/2010/main" xmlns="" val="269019086"/>
+        <p14:creationId xmlns:p14="http://schemas.microsoft.com/office/powerpoint/2010/main" val="269019086"/>
       </p:ext>
     </p:extLst>
   </p:cSld>
@@ -6027,7 +6108,7 @@
     </p:spTree>
     <p:extLst>
       <p:ext uri="{BB962C8B-B14F-4D97-AF65-F5344CB8AC3E}">
-        <p14:creationId xmlns:p14="http://schemas.microsoft.com/office/powerpoint/2010/main" xmlns="" val="1680884351"/>
+        <p14:creationId xmlns:p14="http://schemas.microsoft.com/office/powerpoint/2010/main" val="1680884351"/>
       </p:ext>
     </p:extLst>
   </p:cSld>
@@ -6192,9 +6273,7 @@
               <a:t>available on </a:t>
             </a:r>
             <a:r>
-              <a:rPr lang="en-US" sz="2700" b="1" i="1" dirty="0" smtClean="0">
-                <a:hlinkClick r:id="rId5"/>
-              </a:rPr>
+              <a:rPr lang="en-US" sz="2700" b="1" i="1" dirty="0" smtClean="0"/>
               <a:t>youtube</a:t>
             </a:r>
             <a:r>
@@ -6247,27 +6326,19 @@
               <a:t>for the </a:t>
             </a:r>
             <a:r>
-              <a:rPr lang="en-US" sz="2500" b="1" i="1" dirty="0" smtClean="0">
-                <a:hlinkClick r:id="rId6"/>
-              </a:rPr>
+              <a:rPr lang="en-US" sz="2500" b="1" i="1" dirty="0" smtClean="0"/>
               <a:t>Basic CSS</a:t>
             </a:r>
             <a:r>
-              <a:rPr lang="en-US" sz="2500" dirty="0" smtClean="0">
-                <a:hlinkClick r:id="rId6"/>
-              </a:rPr>
+              <a:rPr lang="en-US" sz="2500" dirty="0" smtClean="0"/>
               <a:t> </a:t>
             </a:r>
             <a:r>
-              <a:rPr lang="en-US" sz="2500" b="1" i="1" dirty="0" smtClean="0">
-                <a:hlinkClick r:id="rId6"/>
-              </a:rPr>
+              <a:rPr lang="en-US" sz="2500" b="1" i="1" dirty="0" smtClean="0"/>
               <a:t>Tutorials</a:t>
             </a:r>
             <a:r>
-              <a:rPr lang="en-US" sz="2500" dirty="0">
-                <a:hlinkClick r:id="rId6"/>
-              </a:rPr>
+              <a:rPr lang="en-US" sz="2500" dirty="0"/>
               <a:t> </a:t>
             </a:r>
             <a:r>
@@ -6289,9 +6360,7 @@
               <a:t>the </a:t>
             </a:r>
             <a:r>
-              <a:rPr lang="en-US" sz="2500" b="1" i="1" dirty="0" smtClean="0">
-                <a:hlinkClick r:id="rId7"/>
-              </a:rPr>
+              <a:rPr lang="en-US" sz="2500" b="1" i="1" dirty="0" smtClean="0"/>
               <a:t>Basic HTML and Java Script Tutorials</a:t>
             </a:r>
             <a:r>
@@ -6356,7 +6425,7 @@
     </p:spTree>
     <p:extLst>
       <p:ext uri="{BB962C8B-B14F-4D97-AF65-F5344CB8AC3E}">
-        <p14:creationId xmlns:p14="http://schemas.microsoft.com/office/powerpoint/2010/main" xmlns="" val="1419989926"/>
+        <p14:creationId xmlns:p14="http://schemas.microsoft.com/office/powerpoint/2010/main" val="1419989926"/>
       </p:ext>
     </p:extLst>
   </p:cSld>
@@ -6426,7 +6495,7 @@
           <a:blip r:embed="rId2">
             <a:extLst>
               <a:ext uri="{28A0092B-C50C-407E-A947-70E740481C1C}">
-                <a14:useLocalDpi xmlns:a14="http://schemas.microsoft.com/office/drawing/2010/main" xmlns="" val="0"/>
+                <a14:useLocalDpi xmlns:a14="http://schemas.microsoft.com/office/drawing/2010/main" val="0"/>
               </a:ext>
             </a:extLst>
           </a:blip>
@@ -6446,7 +6515,7 @@
           <a:noFill/>
           <a:extLst>
             <a:ext uri="{909E8E84-426E-40DD-AFC4-6F175D3DCCD1}">
-              <a14:hiddenFill xmlns:a14="http://schemas.microsoft.com/office/drawing/2010/main" xmlns="">
+              <a14:hiddenFill xmlns:a14="http://schemas.microsoft.com/office/drawing/2010/main">
                 <a:solidFill>
                   <a:srgbClr val="FFFFFF"/>
                 </a:solidFill>
@@ -6458,7 +6527,7 @@
     </p:spTree>
     <p:extLst>
       <p:ext uri="{BB962C8B-B14F-4D97-AF65-F5344CB8AC3E}">
-        <p14:creationId xmlns:p14="http://schemas.microsoft.com/office/powerpoint/2010/main" xmlns="" val="3759781854"/>
+        <p14:creationId xmlns:p14="http://schemas.microsoft.com/office/powerpoint/2010/main" val="3759781854"/>
       </p:ext>
     </p:extLst>
   </p:cSld>
@@ -7317,7 +7386,7 @@
   <a:extraClrSchemeLst/>
   <a:extLst>
     <a:ext uri="{05A4C25C-085E-4340-85A3-A5531E510DB2}">
-      <thm15:themeFamily xmlns:thm15="http://schemas.microsoft.com/office/thememl/2012/main" xmlns="" name="Office Theme" id="{62F939B6-93AF-4DB8-9C6B-D6C7DFDC589F}" vid="{4A3C46E8-61CC-4603-A589-7422A47A8E4A}"/>
+      <thm15:themeFamily xmlns:thm15="http://schemas.microsoft.com/office/thememl/2012/main" name="Office Theme" id="{62F939B6-93AF-4DB8-9C6B-D6C7DFDC589F}" vid="{4A3C46E8-61CC-4603-A589-7422A47A8E4A}"/>
     </a:ext>
   </a:extLst>
 </a:theme>

</xml_diff>